<commit_message>
update to formulation of force interaction between wheel and track
the force interaction was incorrect, this meant penalty for coming up short was inadequate.
the learner was not updated, but modified for testing the env.
looks like some other learning run updates squeezed in here as well.
</commit_message>
<xml_diff>
--- a/supercross_learner/supercross_diagrams.pptx
+++ b/supercross_learner/supercross_diagrams.pptx
@@ -104,6 +104,11 @@
       </a:defRPr>
     </a:lvl9pPr>
   </p:defaultTextStyle>
+  <p:extLst>
+    <p:ext uri="{EFAFB233-063F-42B5-8137-9DF3F51BA10A}">
+      <p15:sldGuideLst xmlns:p15="http://schemas.microsoft.com/office/powerpoint/2012/main"/>
+    </p:ext>
+  </p:extLst>
 </p:presentation>
 </file>
 
@@ -254,7 +259,7 @@
           <a:p>
             <a:fld id="{C15FC8A3-6A92-4D25-A62C-09A6E434F930}" type="datetimeFigureOut">
               <a:rPr lang="en-US" smtClean="0"/>
-              <a:t>2/12/2019</a:t>
+              <a:t>4/11/2019</a:t>
             </a:fld>
             <a:endParaRPr lang="en-US"/>
           </a:p>
@@ -452,7 +457,7 @@
           <a:p>
             <a:fld id="{C15FC8A3-6A92-4D25-A62C-09A6E434F930}" type="datetimeFigureOut">
               <a:rPr lang="en-US" smtClean="0"/>
-              <a:t>2/12/2019</a:t>
+              <a:t>4/11/2019</a:t>
             </a:fld>
             <a:endParaRPr lang="en-US"/>
           </a:p>
@@ -660,7 +665,7 @@
           <a:p>
             <a:fld id="{C15FC8A3-6A92-4D25-A62C-09A6E434F930}" type="datetimeFigureOut">
               <a:rPr lang="en-US" smtClean="0"/>
-              <a:t>2/12/2019</a:t>
+              <a:t>4/11/2019</a:t>
             </a:fld>
             <a:endParaRPr lang="en-US"/>
           </a:p>
@@ -858,7 +863,7 @@
           <a:p>
             <a:fld id="{C15FC8A3-6A92-4D25-A62C-09A6E434F930}" type="datetimeFigureOut">
               <a:rPr lang="en-US" smtClean="0"/>
-              <a:t>2/12/2019</a:t>
+              <a:t>4/11/2019</a:t>
             </a:fld>
             <a:endParaRPr lang="en-US"/>
           </a:p>
@@ -1133,7 +1138,7 @@
           <a:p>
             <a:fld id="{C15FC8A3-6A92-4D25-A62C-09A6E434F930}" type="datetimeFigureOut">
               <a:rPr lang="en-US" smtClean="0"/>
-              <a:t>2/12/2019</a:t>
+              <a:t>4/11/2019</a:t>
             </a:fld>
             <a:endParaRPr lang="en-US"/>
           </a:p>
@@ -1398,7 +1403,7 @@
           <a:p>
             <a:fld id="{C15FC8A3-6A92-4D25-A62C-09A6E434F930}" type="datetimeFigureOut">
               <a:rPr lang="en-US" smtClean="0"/>
-              <a:t>2/12/2019</a:t>
+              <a:t>4/11/2019</a:t>
             </a:fld>
             <a:endParaRPr lang="en-US"/>
           </a:p>
@@ -1810,7 +1815,7 @@
           <a:p>
             <a:fld id="{C15FC8A3-6A92-4D25-A62C-09A6E434F930}" type="datetimeFigureOut">
               <a:rPr lang="en-US" smtClean="0"/>
-              <a:t>2/12/2019</a:t>
+              <a:t>4/11/2019</a:t>
             </a:fld>
             <a:endParaRPr lang="en-US"/>
           </a:p>
@@ -1951,7 +1956,7 @@
           <a:p>
             <a:fld id="{C15FC8A3-6A92-4D25-A62C-09A6E434F930}" type="datetimeFigureOut">
               <a:rPr lang="en-US" smtClean="0"/>
-              <a:t>2/12/2019</a:t>
+              <a:t>4/11/2019</a:t>
             </a:fld>
             <a:endParaRPr lang="en-US"/>
           </a:p>
@@ -2064,7 +2069,7 @@
           <a:p>
             <a:fld id="{C15FC8A3-6A92-4D25-A62C-09A6E434F930}" type="datetimeFigureOut">
               <a:rPr lang="en-US" smtClean="0"/>
-              <a:t>2/12/2019</a:t>
+              <a:t>4/11/2019</a:t>
             </a:fld>
             <a:endParaRPr lang="en-US"/>
           </a:p>
@@ -2375,7 +2380,7 @@
           <a:p>
             <a:fld id="{C15FC8A3-6A92-4D25-A62C-09A6E434F930}" type="datetimeFigureOut">
               <a:rPr lang="en-US" smtClean="0"/>
-              <a:t>2/12/2019</a:t>
+              <a:t>4/11/2019</a:t>
             </a:fld>
             <a:endParaRPr lang="en-US"/>
           </a:p>
@@ -2663,7 +2668,7 @@
           <a:p>
             <a:fld id="{C15FC8A3-6A92-4D25-A62C-09A6E434F930}" type="datetimeFigureOut">
               <a:rPr lang="en-US" smtClean="0"/>
-              <a:t>2/12/2019</a:t>
+              <a:t>4/11/2019</a:t>
             </a:fld>
             <a:endParaRPr lang="en-US"/>
           </a:p>
@@ -2904,7 +2909,7 @@
           <a:p>
             <a:fld id="{C15FC8A3-6A92-4D25-A62C-09A6E434F930}" type="datetimeFigureOut">
               <a:rPr lang="en-US" smtClean="0"/>
-              <a:t>2/12/2019</a:t>
+              <a:t>4/11/2019</a:t>
             </a:fld>
             <a:endParaRPr lang="en-US"/>
           </a:p>
@@ -3339,19 +3344,19 @@
         </p:nvSpPr>
         <p:spPr>
           <a:xfrm>
-            <a:off x="1366982" y="489383"/>
-            <a:ext cx="8931563" cy="369599"/>
+            <a:off x="0" y="114223"/>
+            <a:ext cx="12082509" cy="369599"/>
           </a:xfrm>
         </p:spPr>
         <p:txBody>
           <a:bodyPr>
-            <a:normAutofit fontScale="85000" lnSpcReduction="10000"/>
+            <a:normAutofit fontScale="70000" lnSpcReduction="20000"/>
           </a:bodyPr>
           <a:lstStyle/>
           <a:p>
             <a:r>
               <a:rPr lang="en-US" dirty="0"/>
-              <a:t>Free body diagrams for environment model. The bike model has only one wheel.</a:t>
+              <a:t>Free body diagrams for environment model. The bike model has only one wheel. There is only 1 DOF between wheel and bike.</a:t>
             </a:r>
           </a:p>
         </p:txBody>
@@ -3370,7 +3375,7 @@
         </p:nvCxnSpPr>
         <p:spPr>
           <a:xfrm flipH="1">
-            <a:off x="3315855" y="2697018"/>
+            <a:off x="3315855" y="2235373"/>
             <a:ext cx="5828145" cy="1958109"/>
           </a:xfrm>
           <a:prstGeom prst="line">
@@ -3406,7 +3411,7 @@
         </p:nvCxnSpPr>
         <p:spPr>
           <a:xfrm>
-            <a:off x="3315855" y="4655127"/>
+            <a:off x="3315855" y="4193482"/>
             <a:ext cx="5575300" cy="0"/>
           </a:xfrm>
           <a:prstGeom prst="line">
@@ -3442,7 +3447,7 @@
         </p:nvSpPr>
         <p:spPr>
           <a:xfrm rot="3411148">
-            <a:off x="3786910" y="3796146"/>
+            <a:off x="3725260" y="3357654"/>
             <a:ext cx="1403928" cy="1302326"/>
           </a:xfrm>
           <a:prstGeom prst="arc">
@@ -3489,7 +3494,7 @@
         </p:nvSpPr>
         <p:spPr>
           <a:xfrm>
-            <a:off x="5149275" y="4101130"/>
+            <a:off x="5149275" y="3639485"/>
             <a:ext cx="1025236" cy="369332"/>
           </a:xfrm>
           <a:prstGeom prst="rect">
@@ -3528,7 +3533,7 @@
         </p:nvSpPr>
         <p:spPr>
           <a:xfrm>
-            <a:off x="5892798" y="2981248"/>
+            <a:off x="5892798" y="2519603"/>
             <a:ext cx="674257" cy="674257"/>
           </a:xfrm>
           <a:prstGeom prst="ellipse">
@@ -3576,7 +3581,7 @@
         </p:nvCxnSpPr>
         <p:spPr>
           <a:xfrm flipH="1" flipV="1">
-            <a:off x="6373092" y="3634934"/>
+            <a:off x="6373092" y="3173289"/>
             <a:ext cx="193963" cy="537804"/>
           </a:xfrm>
           <a:prstGeom prst="straightConnector1">
@@ -3618,7 +3623,7 @@
         </p:nvSpPr>
         <p:spPr>
           <a:xfrm>
-            <a:off x="6567055" y="3676072"/>
+            <a:off x="6567055" y="3214427"/>
             <a:ext cx="1025236" cy="369332"/>
           </a:xfrm>
           <a:prstGeom prst="rect">
@@ -3664,7 +3669,7 @@
         </p:nvCxnSpPr>
         <p:spPr>
           <a:xfrm>
-            <a:off x="6227617" y="2447636"/>
+            <a:off x="6227617" y="1985991"/>
             <a:ext cx="0" cy="501132"/>
           </a:xfrm>
           <a:prstGeom prst="straightConnector1">
@@ -3703,7 +3708,7 @@
         </p:nvSpPr>
         <p:spPr>
           <a:xfrm>
-            <a:off x="6174511" y="2373276"/>
+            <a:off x="6174511" y="1911631"/>
             <a:ext cx="1025236" cy="369332"/>
           </a:xfrm>
           <a:prstGeom prst="rect">
@@ -3740,7 +3745,7 @@
         </p:nvCxnSpPr>
         <p:spPr>
           <a:xfrm flipV="1">
-            <a:off x="6229926" y="3084945"/>
+            <a:off x="6229926" y="2623300"/>
             <a:ext cx="544174" cy="205722"/>
           </a:xfrm>
           <a:prstGeom prst="straightConnector1">
@@ -3782,7 +3787,7 @@
         </p:nvSpPr>
         <p:spPr>
           <a:xfrm>
-            <a:off x="6774100" y="2848431"/>
+            <a:off x="6774100" y="2386786"/>
             <a:ext cx="1025236" cy="369332"/>
           </a:xfrm>
           <a:prstGeom prst="rect">
@@ -3821,7 +3826,7 @@
         </p:nvSpPr>
         <p:spPr>
           <a:xfrm>
-            <a:off x="5810058" y="1238707"/>
+            <a:off x="5810058" y="777062"/>
             <a:ext cx="835118" cy="568367"/>
           </a:xfrm>
           <a:prstGeom prst="roundRect">
@@ -3867,7 +3872,7 @@
         </p:nvSpPr>
         <p:spPr>
           <a:xfrm>
-            <a:off x="5190835" y="3096047"/>
+            <a:off x="5190835" y="2634402"/>
             <a:ext cx="1025236" cy="369332"/>
           </a:xfrm>
           <a:prstGeom prst="rect">
@@ -3906,7 +3911,7 @@
         </p:nvSpPr>
         <p:spPr>
           <a:xfrm>
-            <a:off x="5892798" y="896370"/>
+            <a:off x="5892798" y="434725"/>
             <a:ext cx="1025236" cy="369332"/>
           </a:xfrm>
           <a:prstGeom prst="rect">
@@ -3947,7 +3952,7 @@
         </p:nvCxnSpPr>
         <p:spPr>
           <a:xfrm flipV="1">
-            <a:off x="6213761" y="1807074"/>
+            <a:off x="6213761" y="1345429"/>
             <a:ext cx="0" cy="400417"/>
           </a:xfrm>
           <a:prstGeom prst="straightConnector1">
@@ -3986,7 +3991,7 @@
         </p:nvSpPr>
         <p:spPr>
           <a:xfrm>
-            <a:off x="5924306" y="2051533"/>
+            <a:off x="5924306" y="1589888"/>
             <a:ext cx="1025236" cy="369332"/>
           </a:xfrm>
           <a:prstGeom prst="rect">
@@ -4023,7 +4028,7 @@
         </p:nvCxnSpPr>
         <p:spPr>
           <a:xfrm>
-            <a:off x="6093690" y="1467398"/>
+            <a:off x="6093690" y="1005753"/>
             <a:ext cx="0" cy="501132"/>
           </a:xfrm>
           <a:prstGeom prst="straightConnector1">
@@ -4065,7 +4070,7 @@
         </p:nvSpPr>
         <p:spPr>
           <a:xfrm>
-            <a:off x="5675748" y="1775381"/>
+            <a:off x="5675748" y="1313736"/>
             <a:ext cx="1025236" cy="369332"/>
           </a:xfrm>
           <a:prstGeom prst="rect">
@@ -4119,7 +4124,7 @@
         </p:nvCxnSpPr>
         <p:spPr>
           <a:xfrm flipH="1">
-            <a:off x="5395193" y="1498304"/>
+            <a:off x="5395193" y="1036659"/>
             <a:ext cx="708313" cy="16780"/>
           </a:xfrm>
           <a:prstGeom prst="straightConnector1">
@@ -4161,7 +4166,7 @@
         </p:nvSpPr>
         <p:spPr>
           <a:xfrm>
-            <a:off x="4877786" y="1304607"/>
+            <a:off x="4594644" y="834512"/>
             <a:ext cx="1025236" cy="369332"/>
           </a:xfrm>
           <a:prstGeom prst="rect">
@@ -4189,7 +4194,7 @@
                   <a:srgbClr val="00B0F0"/>
                 </a:solidFill>
               </a:rPr>
-              <a:t>Fdx</a:t>
+              <a:t>Fdragx</a:t>
             </a:r>
             <a:endParaRPr lang="en-US" dirty="0">
               <a:solidFill>
@@ -4215,7 +4220,7 @@
         </p:nvCxnSpPr>
         <p:spPr>
           <a:xfrm>
-            <a:off x="6425864" y="1484968"/>
+            <a:off x="6425864" y="1023323"/>
             <a:ext cx="0" cy="505635"/>
           </a:xfrm>
           <a:prstGeom prst="straightConnector1">
@@ -4257,7 +4262,7 @@
         </p:nvSpPr>
         <p:spPr>
           <a:xfrm>
-            <a:off x="6405416" y="1812079"/>
+            <a:off x="6405416" y="1350434"/>
             <a:ext cx="1025236" cy="369332"/>
           </a:xfrm>
           <a:prstGeom prst="rect">
@@ -4285,7 +4290,7 @@
                   <a:srgbClr val="00B0F0"/>
                 </a:solidFill>
               </a:rPr>
-              <a:t>Fdy</a:t>
+              <a:t>Fdragy</a:t>
             </a:r>
             <a:endParaRPr lang="en-US" dirty="0">
               <a:solidFill>
@@ -4309,8 +4314,8 @@
         </p:nvSpPr>
         <p:spPr>
           <a:xfrm>
-            <a:off x="1089891" y="5320145"/>
-            <a:ext cx="3030894" cy="923330"/>
+            <a:off x="5818909" y="4234620"/>
+            <a:ext cx="2716578" cy="923330"/>
           </a:xfrm>
           <a:prstGeom prst="rect">
             <a:avLst/>
@@ -4343,11 +4348,19 @@
             </a:r>
             <a:r>
               <a:rPr lang="en-US" dirty="0" err="1"/>
-              <a:t>Fdx</a:t>
+              <a:t>Fdragx</a:t>
             </a:r>
             <a:r>
               <a:rPr lang="en-US" dirty="0"/>
-              <a:t> + Ft*cos(theta)</a:t>
+              <a:t> + </a:t>
+            </a:r>
+            <a:r>
+              <a:rPr lang="en-US" dirty="0" err="1"/>
+              <a:t>whlFx</a:t>
+            </a:r>
+            <a:r>
+              <a:rPr lang="en-US" dirty="0"/>
+              <a:t> </a:t>
             </a:r>
           </a:p>
           <a:p>
@@ -4365,11 +4378,11 @@
             </a:r>
             <a:r>
               <a:rPr lang="en-US" dirty="0" err="1"/>
-              <a:t>Fdy</a:t>
+              <a:t>Fdragy</a:t>
             </a:r>
             <a:r>
               <a:rPr lang="en-US" dirty="0"/>
-              <a:t> – </a:t>
+              <a:t> - </a:t>
             </a:r>
             <a:r>
               <a:rPr lang="en-US" dirty="0" err="1"/>
@@ -4396,8 +4409,8 @@
         </p:nvSpPr>
         <p:spPr>
           <a:xfrm>
-            <a:off x="5380481" y="5290878"/>
-            <a:ext cx="3380862" cy="923330"/>
+            <a:off x="135646" y="3126624"/>
+            <a:ext cx="5894160" cy="3693319"/>
           </a:xfrm>
           <a:prstGeom prst="rect">
             <a:avLst/>
@@ -4405,7 +4418,7 @@
           <a:noFill/>
         </p:spPr>
         <p:txBody>
-          <a:bodyPr wrap="none" rtlCol="0">
+          <a:bodyPr wrap="square" rtlCol="0">
             <a:spAutoFit/>
           </a:bodyPr>
           <a:lstStyle/>
@@ -4417,8 +4430,155 @@
           </a:p>
           <a:p>
             <a:r>
+              <a:rPr lang="en-US" dirty="0"/>
+              <a:t>If </a:t>
+            </a:r>
+            <a:r>
               <a:rPr lang="en-US" dirty="0" err="1"/>
-              <a:t>axw</a:t>
+              <a:t>inAir</a:t>
+            </a:r>
+            <a:endParaRPr lang="en-US" dirty="0"/>
+          </a:p>
+          <a:p>
+            <a:pPr marL="285750" indent="-285750">
+              <a:buFont typeface="Arial" panose="020B0604020202020204" pitchFamily="34" charset="0"/>
+              <a:buChar char="•"/>
+            </a:pPr>
+            <a:r>
+              <a:rPr lang="en-US" dirty="0" err="1"/>
+              <a:t>Fn</a:t>
+            </a:r>
+            <a:r>
+              <a:rPr lang="en-US" dirty="0"/>
+              <a:t>=Ft=</a:t>
+            </a:r>
+            <a:r>
+              <a:rPr lang="en-US" dirty="0" err="1"/>
+              <a:t>whlFx</a:t>
+            </a:r>
+            <a:r>
+              <a:rPr lang="en-US" dirty="0"/>
+              <a:t>=0</a:t>
+            </a:r>
+          </a:p>
+          <a:p>
+            <a:pPr marL="285750" indent="-285750">
+              <a:buFont typeface="Arial" panose="020B0604020202020204" pitchFamily="34" charset="0"/>
+              <a:buChar char="•"/>
+            </a:pPr>
+            <a:r>
+              <a:rPr lang="en-US" dirty="0" err="1"/>
+              <a:t>whlFy</a:t>
+            </a:r>
+            <a:r>
+              <a:rPr lang="en-US" dirty="0"/>
+              <a:t> =(-</a:t>
+            </a:r>
+            <a:r>
+              <a:rPr lang="en-US" dirty="0" err="1"/>
+              <a:t>Fg</a:t>
+            </a:r>
+            <a:r>
+              <a:rPr lang="en-US" dirty="0"/>
+              <a:t>-Fs)</a:t>
+            </a:r>
+          </a:p>
+          <a:p>
+            <a:r>
+              <a:rPr lang="en-US" dirty="0"/>
+              <a:t>Else</a:t>
+            </a:r>
+          </a:p>
+          <a:p>
+            <a:pPr marL="285750" indent="-285750">
+              <a:buFont typeface="Arial" panose="020B0604020202020204" pitchFamily="34" charset="0"/>
+              <a:buChar char="•"/>
+            </a:pPr>
+            <a:r>
+              <a:rPr lang="en-US" dirty="0" err="1"/>
+              <a:t>Fn</a:t>
+            </a:r>
+            <a:r>
+              <a:rPr lang="en-US" dirty="0"/>
+              <a:t>=(-</a:t>
+            </a:r>
+            <a:r>
+              <a:rPr lang="en-US" dirty="0" err="1"/>
+              <a:t>Fg</a:t>
+            </a:r>
+            <a:r>
+              <a:rPr lang="en-US" dirty="0"/>
+              <a:t>-Fs)*cos(theta)</a:t>
+            </a:r>
+          </a:p>
+          <a:p>
+            <a:pPr marL="285750" indent="-285750">
+              <a:buFont typeface="Arial" panose="020B0604020202020204" pitchFamily="34" charset="0"/>
+              <a:buChar char="•"/>
+            </a:pPr>
+            <a:r>
+              <a:rPr lang="en-US" dirty="0"/>
+              <a:t>Ft=min(</a:t>
+            </a:r>
+            <a:r>
+              <a:rPr lang="en-US" dirty="0" err="1"/>
+              <a:t>trq</a:t>
+            </a:r>
+            <a:r>
+              <a:rPr lang="en-US" dirty="0"/>
+              <a:t>/</a:t>
+            </a:r>
+            <a:r>
+              <a:rPr lang="en-US"/>
+              <a:t>whlRad</a:t>
+            </a:r>
+            <a:r>
+              <a:rPr lang="en-US" dirty="0" err="1"/>
+              <a:t>,Fn</a:t>
+            </a:r>
+            <a:r>
+              <a:rPr lang="en-US" dirty="0"/>
+              <a:t>*nu)+(-</a:t>
+            </a:r>
+            <a:r>
+              <a:rPr lang="en-US" dirty="0" err="1"/>
+              <a:t>Fg</a:t>
+            </a:r>
+            <a:r>
+              <a:rPr lang="en-US" dirty="0"/>
+              <a:t>-Fs)*sin(theta)</a:t>
+            </a:r>
+          </a:p>
+          <a:p>
+            <a:pPr marL="285750" indent="-285750">
+              <a:buFont typeface="Arial" panose="020B0604020202020204" pitchFamily="34" charset="0"/>
+              <a:buChar char="•"/>
+            </a:pPr>
+            <a:r>
+              <a:rPr lang="en-US" dirty="0" err="1"/>
+              <a:t>whlFx</a:t>
+            </a:r>
+            <a:r>
+              <a:rPr lang="en-US" dirty="0"/>
+              <a:t> = -</a:t>
+            </a:r>
+            <a:r>
+              <a:rPr lang="en-US" dirty="0" err="1"/>
+              <a:t>Fn</a:t>
+            </a:r>
+            <a:r>
+              <a:rPr lang="en-US" dirty="0"/>
+              <a:t>*sin(theta)+Ft*cos(theta)</a:t>
+            </a:r>
+          </a:p>
+          <a:p>
+            <a:pPr marL="285750" indent="-285750">
+              <a:buFont typeface="Arial" panose="020B0604020202020204" pitchFamily="34" charset="0"/>
+              <a:buChar char="•"/>
+            </a:pPr>
+            <a:r>
+              <a:rPr lang="en-US" dirty="0" err="1"/>
+              <a:t>whlFy</a:t>
             </a:r>
             <a:r>
               <a:rPr lang="en-US" dirty="0"/>
@@ -4426,9 +4586,41 @@
             </a:r>
             <a:r>
               <a:rPr lang="en-US" dirty="0" err="1"/>
+              <a:t>Fn</a:t>
+            </a:r>
+            <a:r>
+              <a:rPr lang="en-US" dirty="0"/>
+              <a:t>*cos(theta)+Ft*sin(theta)</a:t>
+            </a:r>
+          </a:p>
+          <a:p>
+            <a:endParaRPr lang="en-US" dirty="0"/>
+          </a:p>
+          <a:p>
+            <a:r>
+              <a:rPr lang="en-US" dirty="0" err="1"/>
+              <a:t>Axw</a:t>
+            </a:r>
+            <a:r>
+              <a:rPr lang="en-US" dirty="0"/>
+              <a:t>=</a:t>
+            </a:r>
+            <a:r>
+              <a:rPr lang="en-US" dirty="0" err="1"/>
               <a:t>axb</a:t>
             </a:r>
-            <a:endParaRPr lang="en-US" dirty="0"/>
+            <a:r>
+              <a:rPr lang="en-US" dirty="0"/>
+              <a:t>, there is no x-</a:t>
+            </a:r>
+            <a:r>
+              <a:rPr lang="en-US" dirty="0" err="1"/>
+              <a:t>dir</a:t>
+            </a:r>
+            <a:r>
+              <a:rPr lang="en-US" dirty="0"/>
+              <a:t> DOF between wheel and bike</a:t>
+            </a:r>
           </a:p>
           <a:p>
             <a:r>
@@ -4441,15 +4633,23 @@
             </a:r>
             <a:r>
               <a:rPr lang="en-US" dirty="0"/>
-              <a:t> = -</a:t>
+              <a:t> = </a:t>
             </a:r>
             <a:r>
               <a:rPr lang="en-US" dirty="0" err="1"/>
-              <a:t>Fg</a:t>
+              <a:t>whlFym</a:t>
             </a:r>
             <a:r>
               <a:rPr lang="en-US" dirty="0"/>
-              <a:t> – Fs + Ft*sin(theta)</a:t>
+              <a:t> but this is irrelevant since wheel </a:t>
+            </a:r>
+            <a:r>
+              <a:rPr lang="en-US" dirty="0" err="1"/>
+              <a:t>ayw</a:t>
+            </a:r>
+            <a:r>
+              <a:rPr lang="en-US" dirty="0"/>
+              <a:t> is a function of following track profile.</a:t>
             </a:r>
           </a:p>
         </p:txBody>
@@ -4470,7 +4670,7 @@
         </p:nvCxnSpPr>
         <p:spPr>
           <a:xfrm>
-            <a:off x="6236851" y="3303620"/>
+            <a:off x="6236851" y="2841975"/>
             <a:ext cx="0" cy="501132"/>
           </a:xfrm>
           <a:prstGeom prst="straightConnector1">
@@ -4512,7 +4712,7 @@
         </p:nvSpPr>
         <p:spPr>
           <a:xfrm>
-            <a:off x="5818909" y="3611603"/>
+            <a:off x="5818909" y="3149958"/>
             <a:ext cx="1025236" cy="369332"/>
           </a:xfrm>
           <a:prstGeom prst="rect">

</xml_diff>

<commit_message>
notes aboue variable step solver
</commit_message>
<xml_diff>
--- a/supercross_learner/supercross_diagrams.pptx
+++ b/supercross_learner/supercross_diagrams.pptx
@@ -5428,14 +5428,17 @@
           <a:p>
             <a:r>
               <a:rPr lang="en-US" dirty="0"/>
-              <a:t>Track maker radius at jump base and peak.</a:t>
-            </a:r>
-          </a:p>
-          <a:p>
-            <a:pPr lvl="1"/>
+              <a:t>Check Momentum conservation across change in direction at jump face transition.  </a:t>
+            </a:r>
+          </a:p>
+          <a:p>
+            <a:r>
+              <a:rPr lang="en-US" dirty="0"/>
+              <a:t>Variable step solver? As bike or wheel acceleration in either X or Y direction goes from [</a:t>
+            </a:r>
             <a:r>
               <a:rPr lang="en-US" dirty="0" err="1"/>
-              <a:t>DangDxMax</a:t>
+              <a:t>lwr_thr</a:t>
             </a:r>
             <a:r>
               <a:rPr lang="en-US" dirty="0"/>
@@ -5443,20 +5446,19 @@
             </a:r>
             <a:r>
               <a:rPr lang="en-US" dirty="0" err="1"/>
-              <a:t>secLen</a:t>
-            </a:r>
-            <a:endParaRPr lang="en-US" dirty="0"/>
-          </a:p>
-          <a:p>
+              <a:t>upr_thr</a:t>
+            </a:r>
             <a:r>
               <a:rPr lang="en-US" dirty="0"/>
-              <a:t>Suspension bottoming, ramp up stiffness [1x -&gt; 10x] as travel goes [90% -&gt; 100%]</a:t>
-            </a:r>
-          </a:p>
-          <a:p>
+              <a:t>], time steps goes [dt -&gt; dt/n], where n is positive integer. Still only </a:t>
+            </a:r>
+            <a:r>
+              <a:rPr lang="en-US"/>
+              <a:t>record data every </a:t>
+            </a:r>
             <a:r>
               <a:rPr lang="en-US" dirty="0"/>
-              <a:t>Momentum conservation across change in direction at jump face transition.  </a:t>
+              <a:t>dt, so run sub-loops at dt/n until a dt size step is complete, then record data</a:t>
             </a:r>
           </a:p>
         </p:txBody>

</xml_diff>

<commit_message>
tensorForce learning is working for mk_trk1
</commit_message>
<xml_diff>
--- a/supercross_learner/supercross_diagrams.pptx
+++ b/supercross_learner/supercross_diagrams.pptx
@@ -10,6 +10,8 @@
     <p:sldId id="259" r:id="rId4"/>
     <p:sldId id="260" r:id="rId5"/>
     <p:sldId id="261" r:id="rId6"/>
+    <p:sldId id="264" r:id="rId7"/>
+    <p:sldId id="265" r:id="rId8"/>
   </p:sldIdLst>
   <p:sldSz cx="12192000" cy="6858000"/>
   <p:notesSz cx="6858000" cy="9144000"/>
@@ -263,7 +265,7 @@
           <a:p>
             <a:fld id="{C15FC8A3-6A92-4D25-A62C-09A6E434F930}" type="datetimeFigureOut">
               <a:rPr lang="en-US" smtClean="0"/>
-              <a:t>5/30/2019</a:t>
+              <a:t>6/7/2019</a:t>
             </a:fld>
             <a:endParaRPr lang="en-US"/>
           </a:p>
@@ -461,7 +463,7 @@
           <a:p>
             <a:fld id="{C15FC8A3-6A92-4D25-A62C-09A6E434F930}" type="datetimeFigureOut">
               <a:rPr lang="en-US" smtClean="0"/>
-              <a:t>5/30/2019</a:t>
+              <a:t>6/7/2019</a:t>
             </a:fld>
             <a:endParaRPr lang="en-US"/>
           </a:p>
@@ -669,7 +671,7 @@
           <a:p>
             <a:fld id="{C15FC8A3-6A92-4D25-A62C-09A6E434F930}" type="datetimeFigureOut">
               <a:rPr lang="en-US" smtClean="0"/>
-              <a:t>5/30/2019</a:t>
+              <a:t>6/7/2019</a:t>
             </a:fld>
             <a:endParaRPr lang="en-US"/>
           </a:p>
@@ -867,7 +869,7 @@
           <a:p>
             <a:fld id="{C15FC8A3-6A92-4D25-A62C-09A6E434F930}" type="datetimeFigureOut">
               <a:rPr lang="en-US" smtClean="0"/>
-              <a:t>5/30/2019</a:t>
+              <a:t>6/7/2019</a:t>
             </a:fld>
             <a:endParaRPr lang="en-US"/>
           </a:p>
@@ -1142,7 +1144,7 @@
           <a:p>
             <a:fld id="{C15FC8A3-6A92-4D25-A62C-09A6E434F930}" type="datetimeFigureOut">
               <a:rPr lang="en-US" smtClean="0"/>
-              <a:t>5/30/2019</a:t>
+              <a:t>6/7/2019</a:t>
             </a:fld>
             <a:endParaRPr lang="en-US"/>
           </a:p>
@@ -1407,7 +1409,7 @@
           <a:p>
             <a:fld id="{C15FC8A3-6A92-4D25-A62C-09A6E434F930}" type="datetimeFigureOut">
               <a:rPr lang="en-US" smtClean="0"/>
-              <a:t>5/30/2019</a:t>
+              <a:t>6/7/2019</a:t>
             </a:fld>
             <a:endParaRPr lang="en-US"/>
           </a:p>
@@ -1819,7 +1821,7 @@
           <a:p>
             <a:fld id="{C15FC8A3-6A92-4D25-A62C-09A6E434F930}" type="datetimeFigureOut">
               <a:rPr lang="en-US" smtClean="0"/>
-              <a:t>5/30/2019</a:t>
+              <a:t>6/7/2019</a:t>
             </a:fld>
             <a:endParaRPr lang="en-US"/>
           </a:p>
@@ -1960,7 +1962,7 @@
           <a:p>
             <a:fld id="{C15FC8A3-6A92-4D25-A62C-09A6E434F930}" type="datetimeFigureOut">
               <a:rPr lang="en-US" smtClean="0"/>
-              <a:t>5/30/2019</a:t>
+              <a:t>6/7/2019</a:t>
             </a:fld>
             <a:endParaRPr lang="en-US"/>
           </a:p>
@@ -2073,7 +2075,7 @@
           <a:p>
             <a:fld id="{C15FC8A3-6A92-4D25-A62C-09A6E434F930}" type="datetimeFigureOut">
               <a:rPr lang="en-US" smtClean="0"/>
-              <a:t>5/30/2019</a:t>
+              <a:t>6/7/2019</a:t>
             </a:fld>
             <a:endParaRPr lang="en-US"/>
           </a:p>
@@ -2384,7 +2386,7 @@
           <a:p>
             <a:fld id="{C15FC8A3-6A92-4D25-A62C-09A6E434F930}" type="datetimeFigureOut">
               <a:rPr lang="en-US" smtClean="0"/>
-              <a:t>5/30/2019</a:t>
+              <a:t>6/7/2019</a:t>
             </a:fld>
             <a:endParaRPr lang="en-US"/>
           </a:p>
@@ -2672,7 +2674,7 @@
           <a:p>
             <a:fld id="{C15FC8A3-6A92-4D25-A62C-09A6E434F930}" type="datetimeFigureOut">
               <a:rPr lang="en-US" smtClean="0"/>
-              <a:t>5/30/2019</a:t>
+              <a:t>6/7/2019</a:t>
             </a:fld>
             <a:endParaRPr lang="en-US"/>
           </a:p>
@@ -2913,7 +2915,7 @@
           <a:p>
             <a:fld id="{C15FC8A3-6A92-4D25-A62C-09A6E434F930}" type="datetimeFigureOut">
               <a:rPr lang="en-US" smtClean="0"/>
-              <a:t>5/30/2019</a:t>
+              <a:t>6/7/2019</a:t>
             </a:fld>
             <a:endParaRPr lang="en-US"/>
           </a:p>
@@ -5807,6 +5809,356 @@
 </p:sld>
 </file>
 
+<file path=ppt/slides/slide6.xml><?xml version="1.0" encoding="utf-8"?>
+<p:sld xmlns:a="http://schemas.openxmlformats.org/drawingml/2006/main" xmlns:r="http://schemas.openxmlformats.org/officeDocument/2006/relationships" xmlns:p="http://schemas.openxmlformats.org/presentationml/2006/main">
+  <p:cSld>
+    <p:spTree>
+      <p:nvGrpSpPr>
+        <p:cNvPr id="1" name=""/>
+        <p:cNvGrpSpPr/>
+        <p:nvPr/>
+      </p:nvGrpSpPr>
+      <p:grpSpPr>
+        <a:xfrm>
+          <a:off x="0" y="0"/>
+          <a:ext cx="0" cy="0"/>
+          <a:chOff x="0" y="0"/>
+          <a:chExt cx="0" cy="0"/>
+        </a:xfrm>
+      </p:grpSpPr>
+      <p:sp>
+        <p:nvSpPr>
+          <p:cNvPr id="2" name="Title 1">
+            <a:extLst>
+              <a:ext uri="{FF2B5EF4-FFF2-40B4-BE49-F238E27FC236}">
+                <a16:creationId xmlns:a16="http://schemas.microsoft.com/office/drawing/2014/main" id="{A694CACF-DA40-4BB6-86BE-61D735641D6A}"/>
+              </a:ext>
+            </a:extLst>
+          </p:cNvPr>
+          <p:cNvSpPr>
+            <a:spLocks noGrp="1"/>
+          </p:cNvSpPr>
+          <p:nvPr>
+            <p:ph type="title"/>
+          </p:nvPr>
+        </p:nvSpPr>
+        <p:spPr>
+          <a:xfrm>
+            <a:off x="0" y="-115434"/>
+            <a:ext cx="10515600" cy="1325563"/>
+          </a:xfrm>
+        </p:spPr>
+        <p:txBody>
+          <a:bodyPr/>
+          <a:lstStyle/>
+          <a:p>
+            <a:r>
+              <a:rPr lang="en-US" dirty="0"/>
+              <a:t>First success with </a:t>
+            </a:r>
+            <a:r>
+              <a:rPr lang="en-US" dirty="0" err="1"/>
+              <a:t>tensorForce</a:t>
+            </a:r>
+            <a:endParaRPr lang="en-US" dirty="0"/>
+          </a:p>
+        </p:txBody>
+      </p:sp>
+      <p:sp>
+        <p:nvSpPr>
+          <p:cNvPr id="3" name="Content Placeholder 2">
+            <a:extLst>
+              <a:ext uri="{FF2B5EF4-FFF2-40B4-BE49-F238E27FC236}">
+                <a16:creationId xmlns:a16="http://schemas.microsoft.com/office/drawing/2014/main" id="{B63D27CD-0D37-4F82-82F3-86DA6C78278E}"/>
+              </a:ext>
+            </a:extLst>
+          </p:cNvPr>
+          <p:cNvSpPr>
+            <a:spLocks noGrp="1"/>
+          </p:cNvSpPr>
+          <p:nvPr>
+            <p:ph idx="1"/>
+          </p:nvPr>
+        </p:nvSpPr>
+        <p:spPr>
+          <a:xfrm>
+            <a:off x="123041" y="760556"/>
+            <a:ext cx="10515600" cy="4351338"/>
+          </a:xfrm>
+        </p:spPr>
+        <p:txBody>
+          <a:bodyPr>
+            <a:normAutofit/>
+          </a:bodyPr>
+          <a:lstStyle/>
+          <a:p>
+            <a:r>
+              <a:rPr lang="en-US" sz="1200" dirty="0"/>
+              <a:t>Uses default PPO agent from </a:t>
+            </a:r>
+            <a:r>
+              <a:rPr lang="en-US" sz="1200" dirty="0" err="1"/>
+              <a:t>OpenAI</a:t>
+            </a:r>
+            <a:r>
+              <a:rPr lang="en-US" sz="1200" dirty="0"/>
+              <a:t> gym Cart Pole example.</a:t>
+            </a:r>
+          </a:p>
+          <a:p>
+            <a:r>
+              <a:rPr lang="en-US" sz="1200" dirty="0"/>
+              <a:t>Env is just the track with single triple jump (i.e. mk_trk1()). Plot show throttle and bike X position vs time.</a:t>
+            </a:r>
+          </a:p>
+          <a:p>
+            <a:r>
+              <a:rPr lang="en-US" sz="1200" dirty="0"/>
+              <a:t>We can see the trend towards more full throttle, not rolling backwards on jump face. Still some ambiguity with what to do at start. Obviously because it only see 30m ahead, and 30m ahead of start there is nothing. But what's nice about that is we see that as soon as it does see a feature like jump face, high throttle actions predominate.</a:t>
+            </a:r>
+          </a:p>
+          <a:p>
+            <a:r>
+              <a:rPr lang="en-US" sz="1200" dirty="0"/>
+              <a:t>Reward at ep3000=3.4</a:t>
+            </a:r>
+          </a:p>
+          <a:p>
+            <a:r>
+              <a:rPr lang="en-US" sz="1200" dirty="0"/>
+              <a:t>Best reward =4.1</a:t>
+            </a:r>
+          </a:p>
+          <a:p>
+            <a:r>
+              <a:rPr lang="en-US" sz="1200" dirty="0"/>
+              <a:t>Worst reward = approx. -1e6</a:t>
+            </a:r>
+          </a:p>
+        </p:txBody>
+      </p:sp>
+      <p:pic>
+        <p:nvPicPr>
+          <p:cNvPr id="5" name="Picture 4">
+            <a:extLst>
+              <a:ext uri="{FF2B5EF4-FFF2-40B4-BE49-F238E27FC236}">
+                <a16:creationId xmlns:a16="http://schemas.microsoft.com/office/drawing/2014/main" id="{53A80669-8EDD-4B2B-B6DE-09D9114F95E3}"/>
+              </a:ext>
+            </a:extLst>
+          </p:cNvPr>
+          <p:cNvPicPr>
+            <a:picLocks noChangeAspect="1"/>
+          </p:cNvPicPr>
+          <p:nvPr/>
+        </p:nvPicPr>
+        <p:blipFill>
+          <a:blip r:embed="rId2"/>
+          <a:stretch>
+            <a:fillRect/>
+          </a:stretch>
+        </p:blipFill>
+        <p:spPr>
+          <a:xfrm>
+            <a:off x="2296885" y="1764380"/>
+            <a:ext cx="9895115" cy="5093620"/>
+          </a:xfrm>
+          <a:prstGeom prst="rect">
+            <a:avLst/>
+          </a:prstGeom>
+        </p:spPr>
+      </p:pic>
+    </p:spTree>
+    <p:extLst>
+      <p:ext uri="{BB962C8B-B14F-4D97-AF65-F5344CB8AC3E}">
+        <p14:creationId xmlns:p14="http://schemas.microsoft.com/office/powerpoint/2010/main" val="2794760790"/>
+      </p:ext>
+    </p:extLst>
+  </p:cSld>
+  <p:clrMapOvr>
+    <a:masterClrMapping/>
+  </p:clrMapOvr>
+</p:sld>
+</file>
+
+<file path=ppt/slides/slide7.xml><?xml version="1.0" encoding="utf-8"?>
+<p:sld xmlns:a="http://schemas.openxmlformats.org/drawingml/2006/main" xmlns:r="http://schemas.openxmlformats.org/officeDocument/2006/relationships" xmlns:p="http://schemas.openxmlformats.org/presentationml/2006/main">
+  <p:cSld>
+    <p:spTree>
+      <p:nvGrpSpPr>
+        <p:cNvPr id="1" name=""/>
+        <p:cNvGrpSpPr/>
+        <p:nvPr/>
+      </p:nvGrpSpPr>
+      <p:grpSpPr>
+        <a:xfrm>
+          <a:off x="0" y="0"/>
+          <a:ext cx="0" cy="0"/>
+          <a:chOff x="0" y="0"/>
+          <a:chExt cx="0" cy="0"/>
+        </a:xfrm>
+      </p:grpSpPr>
+      <p:sp>
+        <p:nvSpPr>
+          <p:cNvPr id="2" name="Title 1">
+            <a:extLst>
+              <a:ext uri="{FF2B5EF4-FFF2-40B4-BE49-F238E27FC236}">
+                <a16:creationId xmlns:a16="http://schemas.microsoft.com/office/drawing/2014/main" id="{A694CACF-DA40-4BB6-86BE-61D735641D6A}"/>
+              </a:ext>
+            </a:extLst>
+          </p:cNvPr>
+          <p:cNvSpPr>
+            <a:spLocks noGrp="1"/>
+          </p:cNvSpPr>
+          <p:nvPr>
+            <p:ph type="title"/>
+          </p:nvPr>
+        </p:nvSpPr>
+        <p:spPr>
+          <a:xfrm>
+            <a:off x="0" y="-115434"/>
+            <a:ext cx="10515600" cy="1325563"/>
+          </a:xfrm>
+        </p:spPr>
+        <p:txBody>
+          <a:bodyPr/>
+          <a:lstStyle/>
+          <a:p>
+            <a:r>
+              <a:rPr lang="en-US" dirty="0"/>
+              <a:t>First success with </a:t>
+            </a:r>
+            <a:r>
+              <a:rPr lang="en-US" dirty="0" err="1"/>
+              <a:t>tensorForce</a:t>
+            </a:r>
+            <a:endParaRPr lang="en-US" dirty="0"/>
+          </a:p>
+        </p:txBody>
+      </p:sp>
+      <p:sp>
+        <p:nvSpPr>
+          <p:cNvPr id="3" name="Content Placeholder 2">
+            <a:extLst>
+              <a:ext uri="{FF2B5EF4-FFF2-40B4-BE49-F238E27FC236}">
+                <a16:creationId xmlns:a16="http://schemas.microsoft.com/office/drawing/2014/main" id="{B63D27CD-0D37-4F82-82F3-86DA6C78278E}"/>
+              </a:ext>
+            </a:extLst>
+          </p:cNvPr>
+          <p:cNvSpPr>
+            <a:spLocks noGrp="1"/>
+          </p:cNvSpPr>
+          <p:nvPr>
+            <p:ph idx="1"/>
+          </p:nvPr>
+        </p:nvSpPr>
+        <p:spPr>
+          <a:xfrm>
+            <a:off x="123041" y="815974"/>
+            <a:ext cx="10515600" cy="4351338"/>
+          </a:xfrm>
+        </p:spPr>
+        <p:txBody>
+          <a:bodyPr>
+            <a:normAutofit/>
+          </a:bodyPr>
+          <a:lstStyle/>
+          <a:p>
+            <a:r>
+              <a:rPr lang="en-US" sz="1200" dirty="0"/>
+              <a:t>Uses default PPO agent from </a:t>
+            </a:r>
+            <a:r>
+              <a:rPr lang="en-US" sz="1200" dirty="0" err="1"/>
+              <a:t>OpenAI</a:t>
+            </a:r>
+            <a:r>
+              <a:rPr lang="en-US" sz="1200" dirty="0"/>
+              <a:t> gym Cart Pole example.</a:t>
+            </a:r>
+          </a:p>
+          <a:p>
+            <a:r>
+              <a:rPr lang="en-US" sz="1200" dirty="0"/>
+              <a:t>Env is just the track with single triple jump (i.e. mk_trk1()). Plot show throttle and bike X position vs time.</a:t>
+            </a:r>
+          </a:p>
+          <a:p>
+            <a:r>
+              <a:rPr lang="en-US" sz="1200" dirty="0"/>
+              <a:t>We can see the trend towards more full throttle, shorter episode time, and monotonic </a:t>
+            </a:r>
+            <a:r>
+              <a:rPr lang="en-US" sz="1200" dirty="0" err="1"/>
+              <a:t>Xpos</a:t>
+            </a:r>
+            <a:r>
+              <a:rPr lang="en-US" sz="1200" dirty="0"/>
+              <a:t> increase over episode (i.e. no rolling back down jump face)</a:t>
+            </a:r>
+          </a:p>
+          <a:p>
+            <a:r>
+              <a:rPr lang="en-US" sz="1200" dirty="0"/>
+              <a:t>Reward at ep3000=3.4</a:t>
+            </a:r>
+          </a:p>
+          <a:p>
+            <a:r>
+              <a:rPr lang="en-US" sz="1200" dirty="0"/>
+              <a:t>Best reward =4.1</a:t>
+            </a:r>
+          </a:p>
+          <a:p>
+            <a:r>
+              <a:rPr lang="en-US" sz="1200" dirty="0"/>
+              <a:t>Worst reward = approx. -1e6</a:t>
+            </a:r>
+          </a:p>
+        </p:txBody>
+      </p:sp>
+      <p:pic>
+        <p:nvPicPr>
+          <p:cNvPr id="4" name="Picture 3">
+            <a:extLst>
+              <a:ext uri="{FF2B5EF4-FFF2-40B4-BE49-F238E27FC236}">
+                <a16:creationId xmlns:a16="http://schemas.microsoft.com/office/drawing/2014/main" id="{02176ADC-38E6-4CC8-B6B5-F5829B28C57A}"/>
+              </a:ext>
+            </a:extLst>
+          </p:cNvPr>
+          <p:cNvPicPr>
+            <a:picLocks noChangeAspect="1"/>
+          </p:cNvPicPr>
+          <p:nvPr/>
+        </p:nvPicPr>
+        <p:blipFill>
+          <a:blip r:embed="rId2"/>
+          <a:stretch>
+            <a:fillRect/>
+          </a:stretch>
+        </p:blipFill>
+        <p:spPr>
+          <a:xfrm>
+            <a:off x="2391362" y="1690687"/>
+            <a:ext cx="9800637" cy="5088283"/>
+          </a:xfrm>
+          <a:prstGeom prst="rect">
+            <a:avLst/>
+          </a:prstGeom>
+        </p:spPr>
+      </p:pic>
+    </p:spTree>
+    <p:extLst>
+      <p:ext uri="{BB962C8B-B14F-4D97-AF65-F5344CB8AC3E}">
+        <p14:creationId xmlns:p14="http://schemas.microsoft.com/office/powerpoint/2010/main" val="1348317461"/>
+      </p:ext>
+    </p:extLst>
+  </p:cSld>
+  <p:clrMapOvr>
+    <a:masterClrMapping/>
+  </p:clrMapOvr>
+</p:sld>
+</file>
+
 <file path=ppt/theme/theme1.xml><?xml version="1.0" encoding="utf-8"?>
 <a:theme xmlns:a="http://schemas.openxmlformats.org/drawingml/2006/main" name="Office Theme">
   <a:themeElements>

</xml_diff>

<commit_message>
added ideas about track portion of state vector
</commit_message>
<xml_diff>
--- a/supercross_learner/supercross_diagrams.pptx
+++ b/supercross_learner/supercross_diagrams.pptx
@@ -12,6 +12,7 @@
     <p:sldId id="261" r:id="rId6"/>
     <p:sldId id="264" r:id="rId7"/>
     <p:sldId id="265" r:id="rId8"/>
+    <p:sldId id="266" r:id="rId9"/>
   </p:sldIdLst>
   <p:sldSz cx="12192000" cy="6858000"/>
   <p:notesSz cx="6858000" cy="9144000"/>
@@ -265,7 +266,7 @@
           <a:p>
             <a:fld id="{C15FC8A3-6A92-4D25-A62C-09A6E434F930}" type="datetimeFigureOut">
               <a:rPr lang="en-US" smtClean="0"/>
-              <a:t>6/7/2019</a:t>
+              <a:t>6/8/2019</a:t>
             </a:fld>
             <a:endParaRPr lang="en-US"/>
           </a:p>
@@ -463,7 +464,7 @@
           <a:p>
             <a:fld id="{C15FC8A3-6A92-4D25-A62C-09A6E434F930}" type="datetimeFigureOut">
               <a:rPr lang="en-US" smtClean="0"/>
-              <a:t>6/7/2019</a:t>
+              <a:t>6/8/2019</a:t>
             </a:fld>
             <a:endParaRPr lang="en-US"/>
           </a:p>
@@ -671,7 +672,7 @@
           <a:p>
             <a:fld id="{C15FC8A3-6A92-4D25-A62C-09A6E434F930}" type="datetimeFigureOut">
               <a:rPr lang="en-US" smtClean="0"/>
-              <a:t>6/7/2019</a:t>
+              <a:t>6/8/2019</a:t>
             </a:fld>
             <a:endParaRPr lang="en-US"/>
           </a:p>
@@ -869,7 +870,7 @@
           <a:p>
             <a:fld id="{C15FC8A3-6A92-4D25-A62C-09A6E434F930}" type="datetimeFigureOut">
               <a:rPr lang="en-US" smtClean="0"/>
-              <a:t>6/7/2019</a:t>
+              <a:t>6/8/2019</a:t>
             </a:fld>
             <a:endParaRPr lang="en-US"/>
           </a:p>
@@ -1144,7 +1145,7 @@
           <a:p>
             <a:fld id="{C15FC8A3-6A92-4D25-A62C-09A6E434F930}" type="datetimeFigureOut">
               <a:rPr lang="en-US" smtClean="0"/>
-              <a:t>6/7/2019</a:t>
+              <a:t>6/8/2019</a:t>
             </a:fld>
             <a:endParaRPr lang="en-US"/>
           </a:p>
@@ -1409,7 +1410,7 @@
           <a:p>
             <a:fld id="{C15FC8A3-6A92-4D25-A62C-09A6E434F930}" type="datetimeFigureOut">
               <a:rPr lang="en-US" smtClean="0"/>
-              <a:t>6/7/2019</a:t>
+              <a:t>6/8/2019</a:t>
             </a:fld>
             <a:endParaRPr lang="en-US"/>
           </a:p>
@@ -1821,7 +1822,7 @@
           <a:p>
             <a:fld id="{C15FC8A3-6A92-4D25-A62C-09A6E434F930}" type="datetimeFigureOut">
               <a:rPr lang="en-US" smtClean="0"/>
-              <a:t>6/7/2019</a:t>
+              <a:t>6/8/2019</a:t>
             </a:fld>
             <a:endParaRPr lang="en-US"/>
           </a:p>
@@ -1962,7 +1963,7 @@
           <a:p>
             <a:fld id="{C15FC8A3-6A92-4D25-A62C-09A6E434F930}" type="datetimeFigureOut">
               <a:rPr lang="en-US" smtClean="0"/>
-              <a:t>6/7/2019</a:t>
+              <a:t>6/8/2019</a:t>
             </a:fld>
             <a:endParaRPr lang="en-US"/>
           </a:p>
@@ -2075,7 +2076,7 @@
           <a:p>
             <a:fld id="{C15FC8A3-6A92-4D25-A62C-09A6E434F930}" type="datetimeFigureOut">
               <a:rPr lang="en-US" smtClean="0"/>
-              <a:t>6/7/2019</a:t>
+              <a:t>6/8/2019</a:t>
             </a:fld>
             <a:endParaRPr lang="en-US"/>
           </a:p>
@@ -2386,7 +2387,7 @@
           <a:p>
             <a:fld id="{C15FC8A3-6A92-4D25-A62C-09A6E434F930}" type="datetimeFigureOut">
               <a:rPr lang="en-US" smtClean="0"/>
-              <a:t>6/7/2019</a:t>
+              <a:t>6/8/2019</a:t>
             </a:fld>
             <a:endParaRPr lang="en-US"/>
           </a:p>
@@ -2674,7 +2675,7 @@
           <a:p>
             <a:fld id="{C15FC8A3-6A92-4D25-A62C-09A6E434F930}" type="datetimeFigureOut">
               <a:rPr lang="en-US" smtClean="0"/>
-              <a:t>6/7/2019</a:t>
+              <a:t>6/8/2019</a:t>
             </a:fld>
             <a:endParaRPr lang="en-US"/>
           </a:p>
@@ -2915,7 +2916,7 @@
           <a:p>
             <a:fld id="{C15FC8A3-6A92-4D25-A62C-09A6E434F930}" type="datetimeFigureOut">
               <a:rPr lang="en-US" smtClean="0"/>
-              <a:t>6/7/2019</a:t>
+              <a:t>6/8/2019</a:t>
             </a:fld>
             <a:endParaRPr lang="en-US"/>
           </a:p>
@@ -6159,6 +6160,107 @@
 </p:sld>
 </file>
 
+<file path=ppt/slides/slide8.xml><?xml version="1.0" encoding="utf-8"?>
+<p:sld xmlns:a="http://schemas.openxmlformats.org/drawingml/2006/main" xmlns:r="http://schemas.openxmlformats.org/officeDocument/2006/relationships" xmlns:p="http://schemas.openxmlformats.org/presentationml/2006/main">
+  <p:cSld>
+    <p:spTree>
+      <p:nvGrpSpPr>
+        <p:cNvPr id="1" name=""/>
+        <p:cNvGrpSpPr/>
+        <p:nvPr/>
+      </p:nvGrpSpPr>
+      <p:grpSpPr>
+        <a:xfrm>
+          <a:off x="0" y="0"/>
+          <a:ext cx="0" cy="0"/>
+          <a:chOff x="0" y="0"/>
+          <a:chExt cx="0" cy="0"/>
+        </a:xfrm>
+      </p:grpSpPr>
+      <p:sp>
+        <p:nvSpPr>
+          <p:cNvPr id="3" name="Content Placeholder 2">
+            <a:extLst>
+              <a:ext uri="{FF2B5EF4-FFF2-40B4-BE49-F238E27FC236}">
+                <a16:creationId xmlns:a16="http://schemas.microsoft.com/office/drawing/2014/main" id="{E26834B7-7DB9-447E-B290-A1D4E2D6EC79}"/>
+              </a:ext>
+            </a:extLst>
+          </p:cNvPr>
+          <p:cNvSpPr>
+            <a:spLocks noGrp="1"/>
+          </p:cNvSpPr>
+          <p:nvPr>
+            <p:ph idx="1"/>
+          </p:nvPr>
+        </p:nvSpPr>
+        <p:spPr>
+          <a:xfrm>
+            <a:off x="0" y="5969"/>
+            <a:ext cx="10515600" cy="4351338"/>
+          </a:xfrm>
+        </p:spPr>
+        <p:txBody>
+          <a:bodyPr>
+            <a:normAutofit/>
+          </a:bodyPr>
+          <a:lstStyle/>
+          <a:p>
+            <a:r>
+              <a:rPr lang="en-US" sz="1000" dirty="0"/>
+              <a:t>State ideas</a:t>
+            </a:r>
+          </a:p>
+          <a:p>
+            <a:pPr marL="0" indent="0">
+              <a:buNone/>
+            </a:pPr>
+            <a:r>
+              <a:rPr lang="en-US" sz="1000" dirty="0"/>
+              <a:t>Thinking about what mental model a rider would have for the track, these are some state ideas that could work well.</a:t>
+            </a:r>
+          </a:p>
+          <a:p>
+            <a:pPr marL="514350" indent="-514350">
+              <a:buFont typeface="+mj-lt"/>
+              <a:buAutoNum type="arabicPeriod"/>
+            </a:pPr>
+            <a:r>
+              <a:rPr lang="en-US" sz="1000" dirty="0"/>
+              <a:t>Include a vector which maps out the track features. E.g. 00102040100203, some flat, some flat, a table top, some flat, a double triple jump, some flat, some whoops, etc. this vector encodes the track layout for the agent, so the agent can plan its strategy. A rider would not commit a high fidelity layout to memory, but surely would be able to tell someone the sequence of features from memory.</a:t>
+            </a:r>
+          </a:p>
+          <a:p>
+            <a:pPr marL="514350" indent="-514350">
+              <a:buFont typeface="+mj-lt"/>
+              <a:buAutoNum type="arabicPeriod"/>
+            </a:pPr>
+            <a:r>
+              <a:rPr lang="en-US" sz="1000" dirty="0"/>
+              <a:t>Have the track profile portion of the state vector be variable length. A minimum length, but if there is a long flat section, the resolution would drop, so seeing further in distance space with same number of sample points. This would help the agent start moving at the beginning for tracks that have a start section that is flat for longer distance than the minimum length.  This is sort of attune to how humans look ahead, the more features there are ahead, the less far we look, if there are few or no feature in the near distance, we sort of turn our focus away from that, and look far ahead, with poor resolution, to see what features we can.</a:t>
+            </a:r>
+          </a:p>
+          <a:p>
+            <a:pPr marL="514350" indent="-514350">
+              <a:buFont typeface="+mj-lt"/>
+              <a:buAutoNum type="arabicPeriod"/>
+            </a:pPr>
+            <a:endParaRPr lang="en-US" sz="1000" dirty="0"/>
+          </a:p>
+        </p:txBody>
+      </p:sp>
+    </p:spTree>
+    <p:extLst>
+      <p:ext uri="{BB962C8B-B14F-4D97-AF65-F5344CB8AC3E}">
+        <p14:creationId xmlns:p14="http://schemas.microsoft.com/office/powerpoint/2010/main" val="4286208303"/>
+      </p:ext>
+    </p:extLst>
+  </p:cSld>
+  <p:clrMapOvr>
+    <a:masterClrMapping/>
+  </p:clrMapOvr>
+</p:sld>
+</file>
+
 <file path=ppt/theme/theme1.xml><?xml version="1.0" encoding="utf-8"?>
 <a:theme xmlns:a="http://schemas.openxmlformats.org/drawingml/2006/main" name="Office Theme">
   <a:themeElements>

</xml_diff>